<commit_message>
origin-verification.md: updated appveyor instructions and diagram
</commit_message>
<xml_diff>
--- a/src/diagrams.pptx
+++ b/src/diagrams.pptx
@@ -253,7 +253,7 @@
           <a:p>
             <a:fld id="{E5B2F287-A29C-4C70-831C-74BFCFEDEFEA}" type="datetimeFigureOut">
               <a:rPr lang="de-AT" smtClean="0"/>
-              <a:t>06.02.2023</a:t>
+              <a:t>03.03.2023</a:t>
             </a:fld>
             <a:endParaRPr lang="de-AT"/>
           </a:p>
@@ -423,7 +423,7 @@
           <a:p>
             <a:fld id="{E5B2F287-A29C-4C70-831C-74BFCFEDEFEA}" type="datetimeFigureOut">
               <a:rPr lang="de-AT" smtClean="0"/>
-              <a:t>06.02.2023</a:t>
+              <a:t>03.03.2023</a:t>
             </a:fld>
             <a:endParaRPr lang="de-AT"/>
           </a:p>
@@ -603,7 +603,7 @@
           <a:p>
             <a:fld id="{E5B2F287-A29C-4C70-831C-74BFCFEDEFEA}" type="datetimeFigureOut">
               <a:rPr lang="de-AT" smtClean="0"/>
-              <a:t>06.02.2023</a:t>
+              <a:t>03.03.2023</a:t>
             </a:fld>
             <a:endParaRPr lang="de-AT"/>
           </a:p>
@@ -773,7 +773,7 @@
           <a:p>
             <a:fld id="{E5B2F287-A29C-4C70-831C-74BFCFEDEFEA}" type="datetimeFigureOut">
               <a:rPr lang="de-AT" smtClean="0"/>
-              <a:t>06.02.2023</a:t>
+              <a:t>03.03.2023</a:t>
             </a:fld>
             <a:endParaRPr lang="de-AT"/>
           </a:p>
@@ -1019,7 +1019,7 @@
           <a:p>
             <a:fld id="{E5B2F287-A29C-4C70-831C-74BFCFEDEFEA}" type="datetimeFigureOut">
               <a:rPr lang="de-AT" smtClean="0"/>
-              <a:t>06.02.2023</a:t>
+              <a:t>03.03.2023</a:t>
             </a:fld>
             <a:endParaRPr lang="de-AT"/>
           </a:p>
@@ -1251,7 +1251,7 @@
           <a:p>
             <a:fld id="{E5B2F287-A29C-4C70-831C-74BFCFEDEFEA}" type="datetimeFigureOut">
               <a:rPr lang="de-AT" smtClean="0"/>
-              <a:t>06.02.2023</a:t>
+              <a:t>03.03.2023</a:t>
             </a:fld>
             <a:endParaRPr lang="de-AT"/>
           </a:p>
@@ -1618,7 +1618,7 @@
           <a:p>
             <a:fld id="{E5B2F287-A29C-4C70-831C-74BFCFEDEFEA}" type="datetimeFigureOut">
               <a:rPr lang="de-AT" smtClean="0"/>
-              <a:t>06.02.2023</a:t>
+              <a:t>03.03.2023</a:t>
             </a:fld>
             <a:endParaRPr lang="de-AT"/>
           </a:p>
@@ -1736,7 +1736,7 @@
           <a:p>
             <a:fld id="{E5B2F287-A29C-4C70-831C-74BFCFEDEFEA}" type="datetimeFigureOut">
               <a:rPr lang="de-AT" smtClean="0"/>
-              <a:t>06.02.2023</a:t>
+              <a:t>03.03.2023</a:t>
             </a:fld>
             <a:endParaRPr lang="de-AT"/>
           </a:p>
@@ -1831,7 +1831,7 @@
           <a:p>
             <a:fld id="{E5B2F287-A29C-4C70-831C-74BFCFEDEFEA}" type="datetimeFigureOut">
               <a:rPr lang="de-AT" smtClean="0"/>
-              <a:t>06.02.2023</a:t>
+              <a:t>03.03.2023</a:t>
             </a:fld>
             <a:endParaRPr lang="de-AT"/>
           </a:p>
@@ -2108,7 +2108,7 @@
           <a:p>
             <a:fld id="{E5B2F287-A29C-4C70-831C-74BFCFEDEFEA}" type="datetimeFigureOut">
               <a:rPr lang="de-AT" smtClean="0"/>
-              <a:t>06.02.2023</a:t>
+              <a:t>03.03.2023</a:t>
             </a:fld>
             <a:endParaRPr lang="de-AT"/>
           </a:p>
@@ -2361,7 +2361,7 @@
           <a:p>
             <a:fld id="{E5B2F287-A29C-4C70-831C-74BFCFEDEFEA}" type="datetimeFigureOut">
               <a:rPr lang="de-AT" smtClean="0"/>
-              <a:t>06.02.2023</a:t>
+              <a:t>03.03.2023</a:t>
             </a:fld>
             <a:endParaRPr lang="de-AT"/>
           </a:p>
@@ -2574,7 +2574,7 @@
           <a:p>
             <a:fld id="{E5B2F287-A29C-4C70-831C-74BFCFEDEFEA}" type="datetimeFigureOut">
               <a:rPr lang="de-AT" smtClean="0"/>
-              <a:t>06.02.2023</a:t>
+              <a:t>03.03.2023</a:t>
             </a:fld>
             <a:endParaRPr lang="de-AT"/>
           </a:p>
@@ -28515,7 +28515,7 @@
             <a:pPr algn="ctr"/>
             <a:r>
               <a:rPr lang="en-US" sz="1400" b="1" noProof="1"/>
-              <a:t>(1)</a:t>
+              <a:t>①</a:t>
             </a:r>
             <a:r>
               <a:rPr lang="en-US" sz="1400" noProof="1"/>
@@ -28538,7 +28538,7 @@
         </p:nvSpPr>
         <p:spPr>
           <a:xfrm>
-            <a:off x="7729875" y="2402748"/>
+            <a:off x="7729875" y="2712643"/>
             <a:ext cx="3212892" cy="369332"/>
           </a:xfrm>
           <a:prstGeom prst="rect">
@@ -28554,7 +28554,7 @@
           <a:p>
             <a:r>
               <a:rPr lang="en-US" noProof="1"/>
-              <a:t>CI User</a:t>
+              <a:t>CI User token</a:t>
             </a:r>
           </a:p>
         </p:txBody>
@@ -28573,7 +28573,7 @@
         </p:nvSpPr>
         <p:spPr>
           <a:xfrm>
-            <a:off x="2476981" y="2402748"/>
+            <a:off x="2476981" y="2712643"/>
             <a:ext cx="2574704" cy="369332"/>
           </a:xfrm>
           <a:prstGeom prst="rect">
@@ -28617,7 +28617,7 @@
         </p:nvCxnSpPr>
         <p:spPr>
           <a:xfrm flipH="1">
-            <a:off x="5286322" y="2587414"/>
+            <a:off x="5286322" y="2897309"/>
             <a:ext cx="2160000" cy="0"/>
           </a:xfrm>
           <a:prstGeom prst="straightConnector1">
@@ -28659,7 +28659,7 @@
         </p:nvSpPr>
         <p:spPr>
           <a:xfrm>
-            <a:off x="3246036" y="3002690"/>
+            <a:off x="3246036" y="3312585"/>
             <a:ext cx="1937885" cy="523220"/>
           </a:xfrm>
           <a:prstGeom prst="rect">
@@ -28676,7 +28676,7 @@
             <a:pPr marL="534988" indent="-534988"/>
             <a:r>
               <a:rPr lang="en-US" sz="1400" b="1" noProof="1"/>
-              <a:t>(3)	</a:t>
+              <a:t>③	</a:t>
             </a:r>
             <a:r>
               <a:rPr lang="en-US" sz="1400" noProof="1"/>
@@ -28699,7 +28699,7 @@
         </p:nvSpPr>
         <p:spPr>
           <a:xfrm>
-            <a:off x="2958109" y="3631291"/>
+            <a:off x="2958109" y="3941186"/>
             <a:ext cx="1825192" cy="369332"/>
           </a:xfrm>
           <a:prstGeom prst="rect">
@@ -28739,7 +28739,7 @@
         </p:nvCxnSpPr>
         <p:spPr>
           <a:xfrm>
-            <a:off x="3708782" y="3002690"/>
+            <a:off x="3708782" y="3312585"/>
             <a:ext cx="0" cy="628344"/>
           </a:xfrm>
           <a:prstGeom prst="straightConnector1">
@@ -28781,7 +28781,7 @@
         </p:nvSpPr>
         <p:spPr>
           <a:xfrm>
-            <a:off x="5286322" y="2234344"/>
+            <a:off x="5286322" y="2544239"/>
             <a:ext cx="2160000" cy="307777"/>
           </a:xfrm>
           <a:prstGeom prst="rect">
@@ -28798,11 +28798,7 @@
             <a:pPr algn="ctr"/>
             <a:r>
               <a:rPr lang="en-US" sz="1400" b="1" noProof="1"/>
-              <a:t>(2)</a:t>
-            </a:r>
-            <a:r>
-              <a:rPr lang="en-US" sz="1400" noProof="1"/>
-              <a:t> </a:t>
+              <a:t>② </a:t>
             </a:r>
             <a:r>
               <a:rPr lang="en-US" sz="1200" b="1" noProof="1">
@@ -28845,12 +28841,12 @@
         <p:spPr>
           <a:xfrm>
             <a:off x="2368972" y="1798526"/>
-            <a:ext cx="2709202" cy="1098783"/>
+            <a:ext cx="2709202" cy="1408678"/>
           </a:xfrm>
           <a:prstGeom prst="rect">
             <a:avLst/>
           </a:prstGeom>
-          <a:ln>
+          <a:ln w="19050">
             <a:solidFill>
               <a:srgbClr val="02B1E6"/>
             </a:solidFill>
@@ -28895,12 +28891,12 @@
         <p:spPr>
           <a:xfrm>
             <a:off x="7703386" y="1798526"/>
-            <a:ext cx="3212892" cy="1098783"/>
+            <a:ext cx="3212892" cy="1408678"/>
           </a:xfrm>
           <a:prstGeom prst="rect">
             <a:avLst/>
           </a:prstGeom>
-          <a:ln>
+          <a:ln w="19050">
             <a:solidFill>
               <a:srgbClr val="02B1E6"/>
             </a:solidFill>
@@ -28959,7 +28955,7 @@
         </p:blipFill>
         <p:spPr bwMode="auto">
           <a:xfrm>
-            <a:off x="2560269" y="3637490"/>
+            <a:off x="2560269" y="3947385"/>
             <a:ext cx="363133" cy="363133"/>
           </a:xfrm>
           <a:prstGeom prst="rect">
@@ -28991,7 +28987,7 @@
         </p:nvSpPr>
         <p:spPr>
           <a:xfrm>
-            <a:off x="2970884" y="4000746"/>
+            <a:off x="2970884" y="4310641"/>
             <a:ext cx="2178254" cy="230832"/>
           </a:xfrm>
           <a:prstGeom prst="rect">

</xml_diff>

<commit_message>
start work on office macro landing page
</commit_message>
<xml_diff>
--- a/src/diagrams.pptx
+++ b/src/diagrams.pptx
@@ -16,6 +16,7 @@
     <p:sldId id="260" r:id="rId10"/>
     <p:sldId id="268" r:id="rId11"/>
     <p:sldId id="264" r:id="rId12"/>
+    <p:sldId id="269" r:id="rId13"/>
   </p:sldIdLst>
   <p:sldSz cx="12192000" cy="6858000"/>
   <p:notesSz cx="6858000" cy="9144000"/>
@@ -253,7 +254,7 @@
           <a:p>
             <a:fld id="{E5B2F287-A29C-4C70-831C-74BFCFEDEFEA}" type="datetimeFigureOut">
               <a:rPr lang="de-AT" smtClean="0"/>
-              <a:t>03.03.2023</a:t>
+              <a:t>15.03.2023</a:t>
             </a:fld>
             <a:endParaRPr lang="de-AT"/>
           </a:p>
@@ -423,7 +424,7 @@
           <a:p>
             <a:fld id="{E5B2F287-A29C-4C70-831C-74BFCFEDEFEA}" type="datetimeFigureOut">
               <a:rPr lang="de-AT" smtClean="0"/>
-              <a:t>03.03.2023</a:t>
+              <a:t>15.03.2023</a:t>
             </a:fld>
             <a:endParaRPr lang="de-AT"/>
           </a:p>
@@ -603,7 +604,7 @@
           <a:p>
             <a:fld id="{E5B2F287-A29C-4C70-831C-74BFCFEDEFEA}" type="datetimeFigureOut">
               <a:rPr lang="de-AT" smtClean="0"/>
-              <a:t>03.03.2023</a:t>
+              <a:t>15.03.2023</a:t>
             </a:fld>
             <a:endParaRPr lang="de-AT"/>
           </a:p>
@@ -773,7 +774,7 @@
           <a:p>
             <a:fld id="{E5B2F287-A29C-4C70-831C-74BFCFEDEFEA}" type="datetimeFigureOut">
               <a:rPr lang="de-AT" smtClean="0"/>
-              <a:t>03.03.2023</a:t>
+              <a:t>15.03.2023</a:t>
             </a:fld>
             <a:endParaRPr lang="de-AT"/>
           </a:p>
@@ -1019,7 +1020,7 @@
           <a:p>
             <a:fld id="{E5B2F287-A29C-4C70-831C-74BFCFEDEFEA}" type="datetimeFigureOut">
               <a:rPr lang="de-AT" smtClean="0"/>
-              <a:t>03.03.2023</a:t>
+              <a:t>15.03.2023</a:t>
             </a:fld>
             <a:endParaRPr lang="de-AT"/>
           </a:p>
@@ -1251,7 +1252,7 @@
           <a:p>
             <a:fld id="{E5B2F287-A29C-4C70-831C-74BFCFEDEFEA}" type="datetimeFigureOut">
               <a:rPr lang="de-AT" smtClean="0"/>
-              <a:t>03.03.2023</a:t>
+              <a:t>15.03.2023</a:t>
             </a:fld>
             <a:endParaRPr lang="de-AT"/>
           </a:p>
@@ -1618,7 +1619,7 @@
           <a:p>
             <a:fld id="{E5B2F287-A29C-4C70-831C-74BFCFEDEFEA}" type="datetimeFigureOut">
               <a:rPr lang="de-AT" smtClean="0"/>
-              <a:t>03.03.2023</a:t>
+              <a:t>15.03.2023</a:t>
             </a:fld>
             <a:endParaRPr lang="de-AT"/>
           </a:p>
@@ -1736,7 +1737,7 @@
           <a:p>
             <a:fld id="{E5B2F287-A29C-4C70-831C-74BFCFEDEFEA}" type="datetimeFigureOut">
               <a:rPr lang="de-AT" smtClean="0"/>
-              <a:t>03.03.2023</a:t>
+              <a:t>15.03.2023</a:t>
             </a:fld>
             <a:endParaRPr lang="de-AT"/>
           </a:p>
@@ -1831,7 +1832,7 @@
           <a:p>
             <a:fld id="{E5B2F287-A29C-4C70-831C-74BFCFEDEFEA}" type="datetimeFigureOut">
               <a:rPr lang="de-AT" smtClean="0"/>
-              <a:t>03.03.2023</a:t>
+              <a:t>15.03.2023</a:t>
             </a:fld>
             <a:endParaRPr lang="de-AT"/>
           </a:p>
@@ -2108,7 +2109,7 @@
           <a:p>
             <a:fld id="{E5B2F287-A29C-4C70-831C-74BFCFEDEFEA}" type="datetimeFigureOut">
               <a:rPr lang="de-AT" smtClean="0"/>
-              <a:t>03.03.2023</a:t>
+              <a:t>15.03.2023</a:t>
             </a:fld>
             <a:endParaRPr lang="de-AT"/>
           </a:p>
@@ -2361,7 +2362,7 @@
           <a:p>
             <a:fld id="{E5B2F287-A29C-4C70-831C-74BFCFEDEFEA}" type="datetimeFigureOut">
               <a:rPr lang="de-AT" smtClean="0"/>
-              <a:t>03.03.2023</a:t>
+              <a:t>15.03.2023</a:t>
             </a:fld>
             <a:endParaRPr lang="de-AT"/>
           </a:p>
@@ -2574,7 +2575,7 @@
           <a:p>
             <a:fld id="{E5B2F287-A29C-4C70-831C-74BFCFEDEFEA}" type="datetimeFigureOut">
               <a:rPr lang="de-AT" smtClean="0"/>
-              <a:t>03.03.2023</a:t>
+              <a:t>15.03.2023</a:t>
             </a:fld>
             <a:endParaRPr lang="de-AT"/>
           </a:p>
@@ -11559,6 +11560,106 @@
     <p:extLst>
       <p:ext uri="{BB962C8B-B14F-4D97-AF65-F5344CB8AC3E}">
         <p14:creationId xmlns:p14="http://schemas.microsoft.com/office/powerpoint/2010/main" val="1263397556"/>
+      </p:ext>
+    </p:extLst>
+  </p:cSld>
+  <p:clrMapOvr>
+    <a:masterClrMapping/>
+  </p:clrMapOvr>
+</p:sld>
+</file>
+
+<file path=ppt/slides/slide12.xml><?xml version="1.0" encoding="utf-8"?>
+<p:sld xmlns:a="http://schemas.openxmlformats.org/drawingml/2006/main" xmlns:r="http://schemas.openxmlformats.org/officeDocument/2006/relationships" xmlns:p="http://schemas.openxmlformats.org/presentationml/2006/main">
+  <p:cSld>
+    <p:spTree>
+      <p:nvGrpSpPr>
+        <p:cNvPr id="1" name=""/>
+        <p:cNvGrpSpPr/>
+        <p:nvPr/>
+      </p:nvGrpSpPr>
+      <p:grpSpPr>
+        <a:xfrm>
+          <a:off x="0" y="0"/>
+          <a:ext cx="0" cy="0"/>
+          <a:chOff x="0" y="0"/>
+          <a:chExt cx="0" cy="0"/>
+        </a:xfrm>
+      </p:grpSpPr>
+      <p:pic>
+        <p:nvPicPr>
+          <p:cNvPr id="5" name="Picture 4">
+            <a:extLst>
+              <a:ext uri="{FF2B5EF4-FFF2-40B4-BE49-F238E27FC236}">
+                <a16:creationId xmlns:a16="http://schemas.microsoft.com/office/drawing/2014/main" id="{72BA0714-62FB-43DB-A40F-A49B485D0583}"/>
+              </a:ext>
+            </a:extLst>
+          </p:cNvPr>
+          <p:cNvPicPr>
+            <a:picLocks noChangeAspect="1"/>
+          </p:cNvPicPr>
+          <p:nvPr/>
+        </p:nvPicPr>
+        <p:blipFill rotWithShape="1">
+          <a:blip r:embed="rId2" cstate="print">
+            <a:extLst>
+              <a:ext uri="{28A0092B-C50C-407E-A947-70E740481C1C}">
+                <a14:useLocalDpi xmlns:a14="http://schemas.microsoft.com/office/drawing/2010/main" val="0"/>
+              </a:ext>
+            </a:extLst>
+          </a:blip>
+          <a:srcRect l="4972" r="48174"/>
+          <a:stretch/>
+        </p:blipFill>
+        <p:spPr>
+          <a:xfrm>
+            <a:off x="3064816" y="2428230"/>
+            <a:ext cx="3031184" cy="1175281"/>
+          </a:xfrm>
+          <a:prstGeom prst="rect">
+            <a:avLst/>
+          </a:prstGeom>
+        </p:spPr>
+      </p:pic>
+      <p:pic>
+        <p:nvPicPr>
+          <p:cNvPr id="7" name="Picture 6">
+            <a:extLst>
+              <a:ext uri="{FF2B5EF4-FFF2-40B4-BE49-F238E27FC236}">
+                <a16:creationId xmlns:a16="http://schemas.microsoft.com/office/drawing/2014/main" id="{E9B4EA5C-5447-4DE8-A3F6-407F36D1AB72}"/>
+              </a:ext>
+            </a:extLst>
+          </p:cNvPr>
+          <p:cNvPicPr>
+            <a:picLocks noChangeAspect="1"/>
+          </p:cNvPicPr>
+          <p:nvPr/>
+        </p:nvPicPr>
+        <p:blipFill rotWithShape="1">
+          <a:blip r:embed="rId3" cstate="print">
+            <a:extLst>
+              <a:ext uri="{28A0092B-C50C-407E-A947-70E740481C1C}">
+                <a14:useLocalDpi xmlns:a14="http://schemas.microsoft.com/office/drawing/2010/main" val="0"/>
+              </a:ext>
+            </a:extLst>
+          </a:blip>
+          <a:srcRect l="49288" r="4023"/>
+          <a:stretch/>
+        </p:blipFill>
+        <p:spPr>
+          <a:xfrm>
+            <a:off x="3064817" y="3603511"/>
+            <a:ext cx="3031183" cy="1179434"/>
+          </a:xfrm>
+          <a:prstGeom prst="rect">
+            <a:avLst/>
+          </a:prstGeom>
+        </p:spPr>
+      </p:pic>
+    </p:spTree>
+    <p:extLst>
+      <p:ext uri="{BB962C8B-B14F-4D97-AF65-F5344CB8AC3E}">
+        <p14:creationId xmlns:p14="http://schemas.microsoft.com/office/powerpoint/2010/main" val="2655058859"/>
       </p:ext>
     </p:extLst>
   </p:cSld>

</xml_diff>